<commit_message>
tweaf ZF.pptx, rename russell-paradox.pptx Russell-Paradox
</commit_message>
<xml_diff>
--- a/spring15/slidesS15/ZF.pptx
+++ b/spring15/slidesS15/ZF.pptx
@@ -3792,7 +3792,7 @@
           <a:graphicData uri="http://schemas.openxmlformats.org/presentationml/2006/ole">
             <mc:AlternateContent xmlns:mc="http://schemas.openxmlformats.org/markup-compatibility/2006">
               <mc:Choice xmlns:v="urn:schemas-microsoft-com:vml" Requires="v">
-                <p:oleObj spid="_x0000_s66576" name="Equation" r:id="rId5" imgW="1879600" imgH="431800" progId="Equation.DSMT4">
+                <p:oleObj spid="_x0000_s66578" name="Equation" r:id="rId5" imgW="1879600" imgH="431800" progId="Equation.DSMT4">
                   <p:embed/>
                 </p:oleObj>
               </mc:Choice>
@@ -3918,13 +3918,13 @@
   <p:clrMapOvr>
     <a:masterClrMapping/>
   </p:clrMapOvr>
-  <mc:AlternateContent xmlns:mc="http://schemas.openxmlformats.org/markup-compatibility/2006">
-    <mc:Choice xmlns:p14="http://schemas.microsoft.com/office/powerpoint/2010/main" Requires="p14">
+  <mc:AlternateContent xmlns:mc="http://schemas.openxmlformats.org/markup-compatibility/2006" xmlns:p14="http://schemas.microsoft.com/office/powerpoint/2010/main">
+    <mc:Choice Requires="p14">
       <p:transition spd="med" p14:dur="700" advClick="0">
         <p:fade/>
       </p:transition>
     </mc:Choice>
-    <mc:Fallback>
+    <mc:Fallback xmlns="">
       <p:transition xmlns:p14="http://schemas.microsoft.com/office/powerpoint/2010/main" spd="med" advClick="0">
         <p:fade/>
       </p:transition>
@@ -4205,7 +4205,7 @@
           <a:graphicData uri="http://schemas.openxmlformats.org/presentationml/2006/ole">
             <mc:AlternateContent xmlns:mc="http://schemas.openxmlformats.org/markup-compatibility/2006">
               <mc:Choice xmlns:v="urn:schemas-microsoft-com:vml" Requires="v">
-                <p:oleObj spid="_x0000_s68622" name="Equation" r:id="rId5" imgW="2019300" imgH="457200" progId="Equation.DSMT4">
+                <p:oleObj spid="_x0000_s68624" name="Equation" r:id="rId5" imgW="2019300" imgH="457200" progId="Equation.DSMT4">
                   <p:embed/>
                 </p:oleObj>
               </mc:Choice>
@@ -4949,13 +4949,13 @@
   <p:clrMapOvr>
     <a:masterClrMapping/>
   </p:clrMapOvr>
-  <mc:AlternateContent xmlns:mc="http://schemas.openxmlformats.org/markup-compatibility/2006">
-    <mc:Choice xmlns:p14="http://schemas.microsoft.com/office/powerpoint/2010/main" Requires="p14">
+  <mc:AlternateContent xmlns:mc="http://schemas.openxmlformats.org/markup-compatibility/2006" xmlns:p14="http://schemas.microsoft.com/office/powerpoint/2010/main">
+    <mc:Choice Requires="p14">
       <p:transition spd="med" p14:dur="700" advClick="0">
         <p:fade/>
       </p:transition>
     </mc:Choice>
-    <mc:Fallback>
+    <mc:Fallback xmlns="">
       <p:transition xmlns:p14="http://schemas.microsoft.com/office/powerpoint/2010/main" spd="med" advClick="0">
         <p:fade/>
       </p:transition>
@@ -5310,11 +5310,7 @@
             </a:r>
             <a:r>
               <a:rPr lang="en-US" dirty="0" smtClean="0"/>
-              <a:t>implies </a:t>
-            </a:r>
-            <a:r>
-              <a:rPr lang="en-US" dirty="0" smtClean="0"/>
-              <a:t>that</a:t>
+              <a:t>implies that</a:t>
             </a:r>
           </a:p>
           <a:p>
@@ -5346,13 +5342,8 @@
           <a:p>
             <a:r>
               <a:rPr lang="en-US" dirty="0" smtClean="0"/>
-              <a:t>(2) </a:t>
-            </a:r>
-            <a:r>
-              <a:rPr lang="en-US" dirty="0" smtClean="0"/>
-              <a:t>                                </a:t>
-            </a:r>
-            <a:endParaRPr lang="en-US" dirty="0" smtClean="0"/>
+              <a:t>(2)                                 </a:t>
+            </a:r>
           </a:p>
           <a:p>
             <a:endParaRPr lang="en-US" dirty="0"/>
@@ -5404,7 +5395,7 @@
           <a:graphicData uri="http://schemas.openxmlformats.org/presentationml/2006/ole">
             <mc:AlternateContent xmlns:mc="http://schemas.openxmlformats.org/markup-compatibility/2006">
               <mc:Choice xmlns:v="urn:schemas-microsoft-com:vml" Requires="v">
-                <p:oleObj spid="_x0000_s70661" name="Equation" r:id="rId5" imgW="1473200" imgH="330200" progId="Equation.DSMT4">
+                <p:oleObj spid="_x0000_s70663" name="Equation" r:id="rId5" imgW="1473200" imgH="330200" progId="Equation.DSMT4">
                   <p:embed/>
                 </p:oleObj>
               </mc:Choice>
@@ -5726,11 +5717,7 @@
             </a:r>
             <a:r>
               <a:rPr lang="en-US" dirty="0" smtClean="0"/>
-              <a:t>implies </a:t>
-            </a:r>
-            <a:r>
-              <a:rPr lang="en-US" dirty="0" smtClean="0"/>
-              <a:t>that</a:t>
+              <a:t>implies that</a:t>
             </a:r>
           </a:p>
           <a:p>
@@ -5762,11 +5749,7 @@
           <a:p>
             <a:r>
               <a:rPr lang="en-US" dirty="0" smtClean="0"/>
-              <a:t>(2) </a:t>
-            </a:r>
-            <a:r>
-              <a:rPr lang="en-US" dirty="0" smtClean="0"/>
-              <a:t>                                  is</a:t>
+              <a:t>(2)                                   is</a:t>
             </a:r>
             <a:r>
               <a:rPr lang="en-US" dirty="0">
@@ -5778,35 +5761,13 @@
             </a:r>
             <a:r>
               <a:rPr lang="en-US" dirty="0" smtClean="0"/>
-              <a:t>the </a:t>
-            </a:r>
-            <a:r>
-              <a:rPr lang="en-US" dirty="0" smtClean="0"/>
-              <a:t>collection of all sets </a:t>
+              <a:t>the collection of all sets </a:t>
             </a:r>
             <a:r>
               <a:rPr lang="en-US" dirty="0" smtClean="0">
                 <a:sym typeface="Euclid Symbol"/>
               </a:rPr>
-              <a:t>-- </a:t>
-            </a:r>
-            <a:r>
-              <a:rPr lang="en-US" dirty="0" smtClean="0">
-                <a:sym typeface="Euclid Symbol"/>
-              </a:rPr>
-              <a:t>which </a:t>
-            </a:r>
-            <a:r>
-              <a:rPr lang="en-US" dirty="0" smtClean="0">
-                <a:sym typeface="Euclid Symbol"/>
-              </a:rPr>
-              <a:t>is why it’s not a </a:t>
-            </a:r>
-            <a:r>
-              <a:rPr lang="en-US" dirty="0" smtClean="0">
-                <a:sym typeface="Euclid Symbol"/>
-              </a:rPr>
-              <a:t>set.</a:t>
+              <a:t>-- which is why it’s not a set.</a:t>
             </a:r>
             <a:endParaRPr lang="en-US" dirty="0" smtClean="0"/>
           </a:p>
@@ -5860,7 +5821,7 @@
           <a:graphicData uri="http://schemas.openxmlformats.org/presentationml/2006/ole">
             <mc:AlternateContent xmlns:mc="http://schemas.openxmlformats.org/markup-compatibility/2006">
               <mc:Choice xmlns:v="urn:schemas-microsoft-com:vml" Requires="v">
-                <p:oleObj spid="_x0000_s71684" name="Equation" r:id="rId5" imgW="1473200" imgH="330200" progId="Equation.DSMT4">
+                <p:oleObj spid="_x0000_s71686" name="Equation" r:id="rId5" imgW="1473200" imgH="330200" progId="Equation.DSMT4">
                   <p:embed/>
                 </p:oleObj>
               </mc:Choice>
@@ -5908,13 +5869,13 @@
   <p:clrMapOvr>
     <a:masterClrMapping/>
   </p:clrMapOvr>
-  <mc:AlternateContent xmlns:mc="http://schemas.openxmlformats.org/markup-compatibility/2006">
-    <mc:Choice xmlns:p14="http://schemas.microsoft.com/office/powerpoint/2010/main" Requires="p14">
+  <mc:AlternateContent xmlns:mc="http://schemas.openxmlformats.org/markup-compatibility/2006" xmlns:p14="http://schemas.microsoft.com/office/powerpoint/2010/main">
+    <mc:Choice Requires="p14">
       <p:transition spd="med" p14:dur="600" advClick="0">
         <p:fade/>
       </p:transition>
     </mc:Choice>
-    <mc:Fallback>
+    <mc:Fallback xmlns="">
       <p:transition xmlns:p14="http://schemas.microsoft.com/office/powerpoint/2010/main" spd="med" advClick="0">
         <p:fade/>
       </p:transition>
@@ -5931,7 +5892,7 @@
 </file>
 
 <file path=ppt/slides/slide17.xml><?xml version="1.0" encoding="utf-8"?>
-<p:sld xmlns:a="http://schemas.openxmlformats.org/drawingml/2006/main" xmlns:r="http://schemas.openxmlformats.org/officeDocument/2006/relationships" xmlns:p="http://schemas.openxmlformats.org/presentationml/2006/main">
+<p:sld xmlns:a="http://schemas.openxmlformats.org/drawingml/2006/main" xmlns:r="http://schemas.openxmlformats.org/officeDocument/2006/relationships" xmlns:p="http://schemas.openxmlformats.org/presentationml/2006/main" show="0">
   <p:cSld>
     <p:spTree>
       <p:nvGrpSpPr>
@@ -5969,7 +5930,7 @@
           <a:graphicData uri="http://schemas.openxmlformats.org/presentationml/2006/ole">
             <mc:AlternateContent xmlns:mc="http://schemas.openxmlformats.org/markup-compatibility/2006">
               <mc:Choice xmlns:v="urn:schemas-microsoft-com:vml" Requires="v">
-                <p:oleObj spid="_x0000_s1034" name="Equation" r:id="rId3" imgW="1778000" imgH="558800" progId="Equation.DSMT4">
+                <p:oleObj spid="_x0000_s1037" name="Equation" r:id="rId3" imgW="1778000" imgH="558800" progId="Equation.DSMT4">
                   <p:embed/>
                 </p:oleObj>
               </mc:Choice>
@@ -6031,7 +5992,7 @@
           <a:graphicData uri="http://schemas.openxmlformats.org/presentationml/2006/ole">
             <mc:AlternateContent xmlns:mc="http://schemas.openxmlformats.org/markup-compatibility/2006">
               <mc:Choice xmlns:v="urn:schemas-microsoft-com:vml" Requires="v">
-                <p:oleObj spid="_x0000_s1035" name="Equation" r:id="rId5" imgW="2019300" imgH="203200" progId="Equation.DSMT4">
+                <p:oleObj spid="_x0000_s1038" name="Equation" r:id="rId5" imgW="2019300" imgH="203200" progId="Equation.DSMT4">
                   <p:embed/>
                 </p:oleObj>
               </mc:Choice>
@@ -6166,13 +6127,6 @@
               </a:rPr>
               <a:t>Foundation</a:t>
             </a:r>
-            <a:endParaRPr lang="en-US" sz="5400" dirty="0" smtClean="0">
-              <a:solidFill>
-                <a:srgbClr val="9751CB"/>
-              </a:solidFill>
-              <a:latin typeface="Comic Sans MS"/>
-              <a:cs typeface="Comic Sans MS"/>
-            </a:endParaRPr>
           </a:p>
         </p:txBody>
       </p:sp>
@@ -6186,13 +6140,13 @@
   <p:clrMapOvr>
     <a:masterClrMapping/>
   </p:clrMapOvr>
-  <mc:AlternateContent xmlns:mc="http://schemas.openxmlformats.org/markup-compatibility/2006" xmlns:p14="http://schemas.microsoft.com/office/powerpoint/2010/main">
-    <mc:Choice Requires="p14">
+  <mc:AlternateContent xmlns:mc="http://schemas.openxmlformats.org/markup-compatibility/2006">
+    <mc:Choice xmlns:p14="http://schemas.microsoft.com/office/powerpoint/2010/main" Requires="p14">
       <p:transition spd="slow" p14:dur="900" advClick="0">
         <p:fade/>
       </p:transition>
     </mc:Choice>
-    <mc:Fallback xmlns="">
+    <mc:Fallback>
       <p:transition xmlns:p14="http://schemas.microsoft.com/office/powerpoint/2010/main" spd="slow" advClick="0">
         <p:fade/>
       </p:transition>
@@ -6855,7 +6809,7 @@
           <a:graphicData uri="http://schemas.openxmlformats.org/presentationml/2006/ole">
             <mc:AlternateContent xmlns:mc="http://schemas.openxmlformats.org/markup-compatibility/2006">
               <mc:Choice xmlns:v="urn:schemas-microsoft-com:vml" Requires="v">
-                <p:oleObj spid="_x0000_s61461" name="Equation" r:id="rId5" imgW="1308100" imgH="215900" progId="Equation.DSMT4">
+                <p:oleObj spid="_x0000_s61463" name="Equation" r:id="rId5" imgW="1308100" imgH="215900" progId="Equation.DSMT4">
                   <p:embed/>
                 </p:oleObj>
               </mc:Choice>
@@ -7319,7 +7273,7 @@
           <a:graphicData uri="http://schemas.openxmlformats.org/presentationml/2006/ole">
             <mc:AlternateContent xmlns:mc="http://schemas.openxmlformats.org/markup-compatibility/2006">
               <mc:Choice xmlns:v="urn:schemas-microsoft-com:vml" Requires="v">
-                <p:oleObj spid="_x0000_s64542" name="Equation" r:id="rId5" imgW="1308100" imgH="215900" progId="Equation.DSMT4">
+                <p:oleObj spid="_x0000_s64545" name="Equation" r:id="rId5" imgW="1308100" imgH="215900" progId="Equation.DSMT4">
                   <p:embed/>
                 </p:oleObj>
               </mc:Choice>
@@ -7460,7 +7414,7 @@
           <a:graphicData uri="http://schemas.openxmlformats.org/presentationml/2006/ole">
             <mc:AlternateContent xmlns:mc="http://schemas.openxmlformats.org/markup-compatibility/2006">
               <mc:Choice xmlns:v="urn:schemas-microsoft-com:vml" Requires="v">
-                <p:oleObj spid="_x0000_s64543" name="Equation" r:id="rId7" imgW="1308100" imgH="215900" progId="Equation.DSMT4">
+                <p:oleObj spid="_x0000_s64546" name="Equation" r:id="rId7" imgW="1308100" imgH="215900" progId="Equation.DSMT4">
                   <p:embed/>
                 </p:oleObj>
               </mc:Choice>
@@ -7636,7 +7590,7 @@
           <a:graphicData uri="http://schemas.openxmlformats.org/presentationml/2006/ole">
             <mc:AlternateContent xmlns:mc="http://schemas.openxmlformats.org/markup-compatibility/2006">
               <mc:Choice xmlns:v="urn:schemas-microsoft-com:vml" Requires="v">
-                <p:oleObj spid="_x0000_s60440" name="Equation" r:id="rId5" imgW="1549400" imgH="215900" progId="Equation.DSMT4">
+                <p:oleObj spid="_x0000_s60442" name="Equation" r:id="rId5" imgW="1549400" imgH="215900" progId="Equation.DSMT4">
                   <p:embed/>
                 </p:oleObj>
               </mc:Choice>
@@ -7729,13 +7683,13 @@
   <p:clrMapOvr>
     <a:masterClrMapping/>
   </p:clrMapOvr>
-  <mc:AlternateContent xmlns:mc="http://schemas.openxmlformats.org/markup-compatibility/2006">
-    <mc:Choice xmlns:p14="http://schemas.microsoft.com/office/powerpoint/2010/main" Requires="p14">
+  <mc:AlternateContent xmlns:mc="http://schemas.openxmlformats.org/markup-compatibility/2006" xmlns:p14="http://schemas.microsoft.com/office/powerpoint/2010/main">
+    <mc:Choice Requires="p14">
       <p:transition spd="med" p14:dur="700" advClick="0">
         <p:fade/>
       </p:transition>
     </mc:Choice>
-    <mc:Fallback>
+    <mc:Fallback xmlns="">
       <p:transition xmlns:p14="http://schemas.microsoft.com/office/powerpoint/2010/main" spd="med" advClick="0">
         <p:fade/>
       </p:transition>
@@ -7965,13 +7919,6 @@
               </a:rPr>
               <a:t>Comprehension</a:t>
             </a:r>
-            <a:endParaRPr lang="en-US" sz="4000" dirty="0" smtClean="0">
-              <a:solidFill>
-                <a:srgbClr val="9933FF"/>
-              </a:solidFill>
-              <a:latin typeface="Comic Sans MS"/>
-              <a:cs typeface="Comic Sans MS"/>
-            </a:endParaRPr>
           </a:p>
         </p:txBody>
       </p:sp>
@@ -8096,7 +8043,7 @@
           <a:graphicData uri="http://schemas.openxmlformats.org/presentationml/2006/ole">
             <mc:AlternateContent xmlns:mc="http://schemas.openxmlformats.org/markup-compatibility/2006">
               <mc:Choice xmlns:v="urn:schemas-microsoft-com:vml" Requires="v">
-                <p:oleObj spid="_x0000_s69638" name="Equation" r:id="rId5" imgW="901700" imgH="228600" progId="Equation.DSMT4">
+                <p:oleObj spid="_x0000_s69640" name="Equation" r:id="rId5" imgW="901700" imgH="228600" progId="Equation.DSMT4">
                   <p:embed/>
                 </p:oleObj>
               </mc:Choice>
@@ -8149,13 +8096,13 @@
   <p:clrMapOvr>
     <a:masterClrMapping/>
   </p:clrMapOvr>
-  <mc:AlternateContent xmlns:mc="http://schemas.openxmlformats.org/markup-compatibility/2006">
-    <mc:Choice xmlns:p14="http://schemas.microsoft.com/office/powerpoint/2010/main" Requires="p14">
+  <mc:AlternateContent xmlns:mc="http://schemas.openxmlformats.org/markup-compatibility/2006" xmlns:p14="http://schemas.microsoft.com/office/powerpoint/2010/main">
+    <mc:Choice Requires="p14">
       <p:transition spd="med" p14:dur="700" advClick="0">
         <p:fade/>
       </p:transition>
     </mc:Choice>
-    <mc:Fallback>
+    <mc:Fallback xmlns="">
       <p:transition xmlns:p14="http://schemas.microsoft.com/office/powerpoint/2010/main" spd="med" advClick="0">
         <p:fade/>
       </p:transition>
@@ -9013,13 +8960,6 @@
               </a:rPr>
               <a:t>x</a:t>
             </a:r>
-            <a:endParaRPr lang="en-US" sz="5400" dirty="0" smtClean="0">
-              <a:solidFill>
-                <a:srgbClr val="0000FF"/>
-              </a:solidFill>
-              <a:latin typeface="Comic Sans MS"/>
-              <a:cs typeface="Comic Sans MS"/>
-            </a:endParaRPr>
           </a:p>
         </p:txBody>
       </p:sp>
@@ -9036,13 +8976,13 @@
   <p:clrMapOvr>
     <a:masterClrMapping/>
   </p:clrMapOvr>
-  <mc:AlternateContent xmlns:mc="http://schemas.openxmlformats.org/markup-compatibility/2006">
-    <mc:Choice xmlns:p14="http://schemas.microsoft.com/office/powerpoint/2010/main" Requires="p14">
+  <mc:AlternateContent xmlns:mc="http://schemas.openxmlformats.org/markup-compatibility/2006" xmlns:p14="http://schemas.microsoft.com/office/powerpoint/2010/main">
+    <mc:Choice Requires="p14">
       <p:transition spd="med" p14:dur="700" advClick="0">
         <p:fade/>
       </p:transition>
     </mc:Choice>
-    <mc:Fallback>
+    <mc:Fallback xmlns="">
       <p:transition xmlns:p14="http://schemas.microsoft.com/office/powerpoint/2010/main" spd="med" advClick="0">
         <p:fade/>
       </p:transition>

</xml_diff>